<commit_message>
Documentación y explicación de conceptos JPA
</commit_message>
<xml_diff>
--- a/JPA.pptx
+++ b/JPA.pptx
@@ -13,6 +13,7 @@
     <p:sldId id="262" r:id="rId7"/>
     <p:sldId id="263" r:id="rId8"/>
     <p:sldId id="264" r:id="rId9"/>
+    <p:sldId id="265" r:id="rId10"/>
   </p:sldIdLst>
   <p:sldSz cx="12192000" cy="6858000"/>
   <p:notesSz cx="6858000" cy="9144000"/>
@@ -111,6 +112,11 @@
       </a:defRPr>
     </a:lvl9pPr>
   </p:defaultTextStyle>
+  <p:extLst>
+    <p:ext uri="{EFAFB233-063F-42B5-8137-9DF3F51BA10A}">
+      <p15:sldGuideLst xmlns:p15="http://schemas.microsoft.com/office/powerpoint/2012/main"/>
+    </p:ext>
+  </p:extLst>
 </p:presentation>
 </file>
 
@@ -266,7 +272,7 @@
           <a:p>
             <a:fld id="{45ECC915-3964-4B0E-B95E-56CE683397A3}" type="datetimeFigureOut">
               <a:rPr lang="es-MX" smtClean="0"/>
-              <a:t>14/05/2022</a:t>
+              <a:t>19/05/2022</a:t>
             </a:fld>
             <a:endParaRPr lang="es-MX"/>
           </a:p>
@@ -472,7 +478,7 @@
           <a:p>
             <a:fld id="{45ECC915-3964-4B0E-B95E-56CE683397A3}" type="datetimeFigureOut">
               <a:rPr lang="es-MX" smtClean="0"/>
-              <a:t>14/05/2022</a:t>
+              <a:t>19/05/2022</a:t>
             </a:fld>
             <a:endParaRPr lang="es-MX"/>
           </a:p>
@@ -683,7 +689,7 @@
           <a:p>
             <a:fld id="{45ECC915-3964-4B0E-B95E-56CE683397A3}" type="datetimeFigureOut">
               <a:rPr lang="es-MX" smtClean="0"/>
-              <a:t>14/05/2022</a:t>
+              <a:t>19/05/2022</a:t>
             </a:fld>
             <a:endParaRPr lang="es-MX"/>
           </a:p>
@@ -920,7 +926,7 @@
           <a:p>
             <a:fld id="{45ECC915-3964-4B0E-B95E-56CE683397A3}" type="datetimeFigureOut">
               <a:rPr lang="es-MX" smtClean="0"/>
-              <a:t>14/05/2022</a:t>
+              <a:t>19/05/2022</a:t>
             </a:fld>
             <a:endParaRPr lang="es-MX"/>
           </a:p>
@@ -1198,7 +1204,7 @@
           <a:p>
             <a:fld id="{45ECC915-3964-4B0E-B95E-56CE683397A3}" type="datetimeFigureOut">
               <a:rPr lang="es-MX" smtClean="0"/>
-              <a:t>14/05/2022</a:t>
+              <a:t>19/05/2022</a:t>
             </a:fld>
             <a:endParaRPr lang="es-MX"/>
           </a:p>
@@ -1471,7 +1477,7 @@
           <a:p>
             <a:fld id="{45ECC915-3964-4B0E-B95E-56CE683397A3}" type="datetimeFigureOut">
               <a:rPr lang="es-MX" smtClean="0"/>
-              <a:t>14/05/2022</a:t>
+              <a:t>19/05/2022</a:t>
             </a:fld>
             <a:endParaRPr lang="es-MX"/>
           </a:p>
@@ -1895,7 +1901,7 @@
           <a:p>
             <a:fld id="{45ECC915-3964-4B0E-B95E-56CE683397A3}" type="datetimeFigureOut">
               <a:rPr lang="es-MX" smtClean="0"/>
-              <a:t>14/05/2022</a:t>
+              <a:t>19/05/2022</a:t>
             </a:fld>
             <a:endParaRPr lang="es-MX"/>
           </a:p>
@@ -2036,7 +2042,7 @@
           <a:p>
             <a:fld id="{45ECC915-3964-4B0E-B95E-56CE683397A3}" type="datetimeFigureOut">
               <a:rPr lang="es-MX" smtClean="0"/>
-              <a:t>14/05/2022</a:t>
+              <a:t>19/05/2022</a:t>
             </a:fld>
             <a:endParaRPr lang="es-MX"/>
           </a:p>
@@ -2149,7 +2155,7 @@
           <a:p>
             <a:fld id="{45ECC915-3964-4B0E-B95E-56CE683397A3}" type="datetimeFigureOut">
               <a:rPr lang="es-MX" smtClean="0"/>
-              <a:t>14/05/2022</a:t>
+              <a:t>19/05/2022</a:t>
             </a:fld>
             <a:endParaRPr lang="es-MX"/>
           </a:p>
@@ -2466,7 +2472,7 @@
           <a:p>
             <a:fld id="{45ECC915-3964-4B0E-B95E-56CE683397A3}" type="datetimeFigureOut">
               <a:rPr lang="es-MX" smtClean="0"/>
-              <a:t>14/05/2022</a:t>
+              <a:t>19/05/2022</a:t>
             </a:fld>
             <a:endParaRPr lang="es-MX"/>
           </a:p>
@@ -2763,7 +2769,7 @@
           <a:p>
             <a:fld id="{45ECC915-3964-4B0E-B95E-56CE683397A3}" type="datetimeFigureOut">
               <a:rPr lang="es-MX" smtClean="0"/>
-              <a:t>14/05/2022</a:t>
+              <a:t>19/05/2022</a:t>
             </a:fld>
             <a:endParaRPr lang="es-MX"/>
           </a:p>
@@ -3042,7 +3048,7 @@
           <a:p>
             <a:fld id="{45ECC915-3964-4B0E-B95E-56CE683397A3}" type="datetimeFigureOut">
               <a:rPr lang="es-MX" smtClean="0"/>
-              <a:t>14/05/2022</a:t>
+              <a:t>19/05/2022</a:t>
             </a:fld>
             <a:endParaRPr lang="es-MX"/>
           </a:p>
@@ -3695,7 +3701,12 @@
             <p:ph idx="1"/>
           </p:nvPr>
         </p:nvSpPr>
-        <p:spPr/>
+        <p:spPr>
+          <a:xfrm>
+            <a:off x="838200" y="2371314"/>
+            <a:ext cx="10515600" cy="2300008"/>
+          </a:xfrm>
+        </p:spPr>
         <p:txBody>
           <a:bodyPr/>
           <a:lstStyle/>
@@ -3758,49 +3769,13 @@
             </a:r>
           </a:p>
           <a:p>
-            <a:pPr marL="0" indent="0" algn="just">
+            <a:pPr marL="0" indent="0">
               <a:buNone/>
             </a:pPr>
-            <a:r>
-              <a:rPr lang="es-MX" dirty="0"/>
-              <a:t>JPA utiliza las siguientes interfaces: </a:t>
-            </a:r>
-          </a:p>
-          <a:p>
             <a:endParaRPr lang="es-MX" dirty="0"/>
           </a:p>
         </p:txBody>
       </p:sp>
-      <p:pic>
-        <p:nvPicPr>
-          <p:cNvPr id="4" name="Imagen 3">
-            <a:extLst>
-              <a:ext uri="{FF2B5EF4-FFF2-40B4-BE49-F238E27FC236}">
-                <a16:creationId xmlns:a16="http://schemas.microsoft.com/office/drawing/2014/main" id="{EB4435D4-E6CD-465C-A664-08F9C96F7B73}"/>
-              </a:ext>
-            </a:extLst>
-          </p:cNvPr>
-          <p:cNvPicPr>
-            <a:picLocks noChangeAspect="1"/>
-          </p:cNvPicPr>
-          <p:nvPr/>
-        </p:nvPicPr>
-        <p:blipFill>
-          <a:blip r:embed="rId2"/>
-          <a:stretch>
-            <a:fillRect/>
-          </a:stretch>
-        </p:blipFill>
-        <p:spPr>
-          <a:xfrm>
-            <a:off x="2957512" y="4244219"/>
-            <a:ext cx="6276975" cy="1743075"/>
-          </a:xfrm>
-          <a:prstGeom prst="rect">
-            <a:avLst/>
-          </a:prstGeom>
-        </p:spPr>
-      </p:pic>
     </p:spTree>
     <p:extLst>
       <p:ext uri="{BB962C8B-B14F-4D97-AF65-F5344CB8AC3E}">
@@ -4927,6 +4902,379 @@
     <p:extLst>
       <p:ext uri="{BB962C8B-B14F-4D97-AF65-F5344CB8AC3E}">
         <p14:creationId xmlns:p14="http://schemas.microsoft.com/office/powerpoint/2010/main" val="4110970456"/>
+      </p:ext>
+    </p:extLst>
+  </p:cSld>
+  <p:clrMapOvr>
+    <a:masterClrMapping/>
+  </p:clrMapOvr>
+</p:sld>
+</file>
+
+<file path=ppt/slides/slide9.xml><?xml version="1.0" encoding="utf-8"?>
+<p:sld xmlns:a="http://schemas.openxmlformats.org/drawingml/2006/main" xmlns:r="http://schemas.openxmlformats.org/officeDocument/2006/relationships" xmlns:p="http://schemas.openxmlformats.org/presentationml/2006/main">
+  <p:cSld>
+    <p:spTree>
+      <p:nvGrpSpPr>
+        <p:cNvPr id="1" name=""/>
+        <p:cNvGrpSpPr/>
+        <p:nvPr/>
+      </p:nvGrpSpPr>
+      <p:grpSpPr>
+        <a:xfrm>
+          <a:off x="0" y="0"/>
+          <a:ext cx="0" cy="0"/>
+          <a:chOff x="0" y="0"/>
+          <a:chExt cx="0" cy="0"/>
+        </a:xfrm>
+      </p:grpSpPr>
+      <p:graphicFrame>
+        <p:nvGraphicFramePr>
+          <p:cNvPr id="4" name="Tabla 4">
+            <a:extLst>
+              <a:ext uri="{FF2B5EF4-FFF2-40B4-BE49-F238E27FC236}">
+                <a16:creationId xmlns:a16="http://schemas.microsoft.com/office/drawing/2014/main" id="{833316FF-DD01-4112-9556-57FBE6CA293F}"/>
+              </a:ext>
+            </a:extLst>
+          </p:cNvPr>
+          <p:cNvGraphicFramePr>
+            <a:graphicFrameLocks noGrp="1"/>
+          </p:cNvGraphicFramePr>
+          <p:nvPr>
+            <p:ph idx="1"/>
+            <p:extLst>
+              <p:ext uri="{D42A27DB-BD31-4B8C-83A1-F6EECF244321}">
+                <p14:modId xmlns:p14="http://schemas.microsoft.com/office/powerpoint/2010/main" val="875653832"/>
+              </p:ext>
+            </p:extLst>
+          </p:nvPr>
+        </p:nvGraphicFramePr>
+        <p:xfrm>
+          <a:off x="838201" y="288879"/>
+          <a:ext cx="10515597" cy="6280242"/>
+        </p:xfrm>
+        <a:graphic>
+          <a:graphicData uri="http://schemas.openxmlformats.org/drawingml/2006/table">
+            <a:tbl>
+              <a:tblPr firstRow="1" bandRow="1">
+                <a:tableStyleId>{5C22544A-7EE6-4342-B048-85BDC9FD1C3A}</a:tableStyleId>
+              </a:tblPr>
+              <a:tblGrid>
+                <a:gridCol w="3505199">
+                  <a:extLst>
+                    <a:ext uri="{9D8B030D-6E8A-4147-A177-3AD203B41FA5}">
+                      <a16:colId xmlns:a16="http://schemas.microsoft.com/office/drawing/2014/main" val="2468598298"/>
+                    </a:ext>
+                  </a:extLst>
+                </a:gridCol>
+                <a:gridCol w="3505199">
+                  <a:extLst>
+                    <a:ext uri="{9D8B030D-6E8A-4147-A177-3AD203B41FA5}">
+                      <a16:colId xmlns:a16="http://schemas.microsoft.com/office/drawing/2014/main" val="1523838951"/>
+                    </a:ext>
+                  </a:extLst>
+                </a:gridCol>
+                <a:gridCol w="3505199">
+                  <a:extLst>
+                    <a:ext uri="{9D8B030D-6E8A-4147-A177-3AD203B41FA5}">
+                      <a16:colId xmlns:a16="http://schemas.microsoft.com/office/drawing/2014/main" val="1160413274"/>
+                    </a:ext>
+                  </a:extLst>
+                </a:gridCol>
+              </a:tblGrid>
+              <a:tr h="610962">
+                <a:tc>
+                  <a:txBody>
+                    <a:bodyPr/>
+                    <a:lstStyle/>
+                    <a:p>
+                      <a:r>
+                        <a:rPr lang="es-MX" dirty="0"/>
+                        <a:t>Objecto</a:t>
+                      </a:r>
+                    </a:p>
+                  </a:txBody>
+                  <a:tcPr anchor="ctr"/>
+                </a:tc>
+                <a:tc>
+                  <a:txBody>
+                    <a:bodyPr/>
+                    <a:lstStyle/>
+                    <a:p>
+                      <a:r>
+                        <a:rPr lang="es-MX" dirty="0"/>
+                        <a:t>API Object</a:t>
+                      </a:r>
+                    </a:p>
+                  </a:txBody>
+                  <a:tcPr anchor="ctr"/>
+                </a:tc>
+                <a:tc>
+                  <a:txBody>
+                    <a:bodyPr/>
+                    <a:lstStyle/>
+                    <a:p>
+                      <a:r>
+                        <a:rPr lang="es-MX" dirty="0"/>
+                        <a:t>Descripción</a:t>
+                      </a:r>
+                    </a:p>
+                  </a:txBody>
+                  <a:tcPr anchor="ctr"/>
+                </a:tc>
+                <a:extLst>
+                  <a:ext uri="{0D108BD9-81ED-4DB2-BD59-A6C34878D82A}">
+                    <a16:rowId xmlns:a16="http://schemas.microsoft.com/office/drawing/2014/main" val="3166500721"/>
+                  </a:ext>
+                </a:extLst>
+              </a:tr>
+              <a:tr h="610962">
+                <a:tc>
+                  <a:txBody>
+                    <a:bodyPr/>
+                    <a:lstStyle/>
+                    <a:p>
+                      <a:r>
+                        <a:rPr lang="es-MX" dirty="0"/>
+                        <a:t>Persistence</a:t>
+                      </a:r>
+                    </a:p>
+                  </a:txBody>
+                  <a:tcPr anchor="ctr"/>
+                </a:tc>
+                <a:tc>
+                  <a:txBody>
+                    <a:bodyPr/>
+                    <a:lstStyle/>
+                    <a:p>
+                      <a:r>
+                        <a:rPr lang="es-MX" dirty="0"/>
+                        <a:t>Persistence</a:t>
+                      </a:r>
+                    </a:p>
+                  </a:txBody>
+                  <a:tcPr anchor="ctr"/>
+                </a:tc>
+                <a:tc>
+                  <a:txBody>
+                    <a:bodyPr/>
+                    <a:lstStyle/>
+                    <a:p>
+                      <a:r>
+                        <a:rPr lang="es-MX" dirty="0"/>
+                        <a:t>Clase de configuración para obtener un administrador de fábrica de entidades (Entity Manager Factory)</a:t>
+                      </a:r>
+                    </a:p>
+                  </a:txBody>
+                  <a:tcPr/>
+                </a:tc>
+                <a:extLst>
+                  <a:ext uri="{0D108BD9-81ED-4DB2-BD59-A6C34878D82A}">
+                    <a16:rowId xmlns:a16="http://schemas.microsoft.com/office/drawing/2014/main" val="2380779591"/>
+                  </a:ext>
+                </a:extLst>
+              </a:tr>
+              <a:tr h="610962">
+                <a:tc>
+                  <a:txBody>
+                    <a:bodyPr/>
+                    <a:lstStyle/>
+                    <a:p>
+                      <a:r>
+                        <a:rPr lang="es-MX" dirty="0"/>
+                        <a:t>Entity Manager Factory</a:t>
+                      </a:r>
+                    </a:p>
+                  </a:txBody>
+                  <a:tcPr anchor="ctr"/>
+                </a:tc>
+                <a:tc>
+                  <a:txBody>
+                    <a:bodyPr/>
+                    <a:lstStyle/>
+                    <a:p>
+                      <a:r>
+                        <a:rPr lang="es-MX" dirty="0"/>
+                        <a:t>EntityManagerFactory</a:t>
+                      </a:r>
+                    </a:p>
+                  </a:txBody>
+                  <a:tcPr anchor="ctr"/>
+                </a:tc>
+                <a:tc>
+                  <a:txBody>
+                    <a:bodyPr/>
+                    <a:lstStyle/>
+                    <a:p>
+                      <a:r>
+                        <a:rPr lang="es-MX" dirty="0"/>
+                        <a:t>Objecto de fábrica configurado utilizado para obtener administrador de entidades.</a:t>
+                      </a:r>
+                    </a:p>
+                  </a:txBody>
+                  <a:tcPr/>
+                </a:tc>
+                <a:extLst>
+                  <a:ext uri="{0D108BD9-81ED-4DB2-BD59-A6C34878D82A}">
+                    <a16:rowId xmlns:a16="http://schemas.microsoft.com/office/drawing/2014/main" val="3822889307"/>
+                  </a:ext>
+                </a:extLst>
+              </a:tr>
+              <a:tr h="610962">
+                <a:tc>
+                  <a:txBody>
+                    <a:bodyPr/>
+                    <a:lstStyle/>
+                    <a:p>
+                      <a:r>
+                        <a:rPr lang="es-MX" dirty="0"/>
+                        <a:t>Persistence Unit</a:t>
+                      </a:r>
+                    </a:p>
+                  </a:txBody>
+                  <a:tcPr anchor="ctr"/>
+                </a:tc>
+                <a:tc>
+                  <a:txBody>
+                    <a:bodyPr/>
+                    <a:lstStyle/>
+                    <a:p>
+                      <a:r>
+                        <a:rPr lang="es-MX" dirty="0"/>
+                        <a:t>--</a:t>
+                      </a:r>
+                    </a:p>
+                  </a:txBody>
+                  <a:tcPr anchor="ctr"/>
+                </a:tc>
+                <a:tc>
+                  <a:txBody>
+                    <a:bodyPr/>
+                    <a:lstStyle/>
+                    <a:p>
+                      <a:r>
+                        <a:rPr lang="es-MX" dirty="0"/>
+                        <a:t>Configuración con nombre que declara las clases de entidad. (Inyecta una instancia EntityManagerFactory).</a:t>
+                      </a:r>
+                    </a:p>
+                  </a:txBody>
+                  <a:tcPr/>
+                </a:tc>
+                <a:extLst>
+                  <a:ext uri="{0D108BD9-81ED-4DB2-BD59-A6C34878D82A}">
+                    <a16:rowId xmlns:a16="http://schemas.microsoft.com/office/drawing/2014/main" val="335267938"/>
+                  </a:ext>
+                </a:extLst>
+              </a:tr>
+              <a:tr h="610962">
+                <a:tc>
+                  <a:txBody>
+                    <a:bodyPr/>
+                    <a:lstStyle/>
+                    <a:p>
+                      <a:r>
+                        <a:rPr lang="es-MX" dirty="0"/>
+                        <a:t>Entity Manager</a:t>
+                      </a:r>
+                    </a:p>
+                  </a:txBody>
+                  <a:tcPr anchor="ctr"/>
+                </a:tc>
+                <a:tc>
+                  <a:txBody>
+                    <a:bodyPr/>
+                    <a:lstStyle/>
+                    <a:p>
+                      <a:r>
+                        <a:rPr lang="es-MX" dirty="0"/>
+                        <a:t>EntityManager</a:t>
+                      </a:r>
+                    </a:p>
+                  </a:txBody>
+                  <a:tcPr anchor="ctr"/>
+                </a:tc>
+                <a:tc>
+                  <a:txBody>
+                    <a:bodyPr/>
+                    <a:lstStyle/>
+                    <a:p>
+                      <a:r>
+                        <a:rPr lang="es-MX" dirty="0"/>
+                        <a:t>Objeto API utilizado para realizar operaciones y consultas de entidades</a:t>
+                      </a:r>
+                    </a:p>
+                  </a:txBody>
+                  <a:tcPr/>
+                </a:tc>
+                <a:extLst>
+                  <a:ext uri="{0D108BD9-81ED-4DB2-BD59-A6C34878D82A}">
+                    <a16:rowId xmlns:a16="http://schemas.microsoft.com/office/drawing/2014/main" val="4046115886"/>
+                  </a:ext>
+                </a:extLst>
+              </a:tr>
+              <a:tr h="610962">
+                <a:tc>
+                  <a:txBody>
+                    <a:bodyPr/>
+                    <a:lstStyle/>
+                    <a:p>
+                      <a:r>
+                        <a:rPr lang="es-MX" dirty="0" err="1"/>
+                        <a:t>Persit</a:t>
+                      </a:r>
+                      <a:r>
+                        <a:rPr lang="es-MX" dirty="0"/>
+                        <a:t> </a:t>
+                      </a:r>
+                      <a:r>
+                        <a:rPr lang="es-MX" dirty="0" err="1"/>
+                        <a:t>Context</a:t>
+                      </a:r>
+                      <a:endParaRPr lang="es-MX" dirty="0"/>
+                    </a:p>
+                  </a:txBody>
+                  <a:tcPr anchor="ctr"/>
+                </a:tc>
+                <a:tc>
+                  <a:txBody>
+                    <a:bodyPr/>
+                    <a:lstStyle/>
+                    <a:p>
+                      <a:r>
+                        <a:rPr lang="es-MX" dirty="0"/>
+                        <a:t>--</a:t>
+                      </a:r>
+                    </a:p>
+                  </a:txBody>
+                  <a:tcPr anchor="ctr"/>
+                </a:tc>
+                <a:tc>
+                  <a:txBody>
+                    <a:bodyPr/>
+                    <a:lstStyle/>
+                    <a:p>
+                      <a:r>
+                        <a:rPr lang="es-MX" dirty="0"/>
+                        <a:t>Conjunto de todas las instancias de entidad administradas por un administrador de entidad especifico. (Inyecta una instancia EntityManager).</a:t>
+                      </a:r>
+                    </a:p>
+                  </a:txBody>
+                  <a:tcPr/>
+                </a:tc>
+                <a:extLst>
+                  <a:ext uri="{0D108BD9-81ED-4DB2-BD59-A6C34878D82A}">
+                    <a16:rowId xmlns:a16="http://schemas.microsoft.com/office/drawing/2014/main" val="4231907820"/>
+                  </a:ext>
+                </a:extLst>
+              </a:tr>
+            </a:tbl>
+          </a:graphicData>
+        </a:graphic>
+      </p:graphicFrame>
+    </p:spTree>
+    <p:extLst>
+      <p:ext uri="{BB962C8B-B14F-4D97-AF65-F5344CB8AC3E}">
+        <p14:creationId xmlns:p14="http://schemas.microsoft.com/office/powerpoint/2010/main" val="2579029615"/>
       </p:ext>
     </p:extLst>
   </p:cSld>

</xml_diff>